<commit_message>
Added additional info section. Remaining pages: Flight, Map and Search.
</commit_message>
<xml_diff>
--- a/Aero_Flights_Deliverable_0.pptx
+++ b/Aero_Flights_Deliverable_0.pptx
@@ -5,10 +5,10 @@
     <p:sldMasterId id="2147483840" r:id="rId1"/>
   </p:sldMasterIdLst>
   <p:notesMasterIdLst>
-    <p:notesMasterId r:id="rId10"/>
+    <p:notesMasterId r:id="rId11"/>
   </p:notesMasterIdLst>
   <p:handoutMasterIdLst>
-    <p:handoutMasterId r:id="rId11"/>
+    <p:handoutMasterId r:id="rId12"/>
   </p:handoutMasterIdLst>
   <p:sldIdLst>
     <p:sldId id="256" r:id="rId2"/>
@@ -19,6 +19,7 @@
     <p:sldId id="262" r:id="rId7"/>
     <p:sldId id="263" r:id="rId8"/>
     <p:sldId id="264" r:id="rId9"/>
+    <p:sldId id="265" r:id="rId10"/>
   </p:sldIdLst>
   <p:sldSz cx="12192000" cy="6858000"/>
   <p:notesSz cx="6858000" cy="9144000"/>
@@ -120,6 +121,9 @@
   <p:extLst>
     <p:ext uri="{EFAFB233-063F-42B5-8137-9DF3F51BA10A}">
       <p15:sldGuideLst xmlns:p15="http://schemas.microsoft.com/office/powerpoint/2012/main"/>
+    </p:ext>
+    <p:ext uri="{2D200454-40CA-4A62-9FC3-DE9A4176ACB9}">
+      <p15:notesGuideLst xmlns:p15="http://schemas.microsoft.com/office/powerpoint/2012/main"/>
     </p:ext>
   </p:extLst>
 </p:presentation>
@@ -3902,7 +3906,7 @@
           <p:cNvPr id="2" name="Title 1">
             <a:extLst>
               <a:ext uri="{FF2B5EF4-FFF2-40B4-BE49-F238E27FC236}">
-                <a16:creationId xmlns:a16="http://schemas.microsoft.com/office/drawing/2014/main" xmlns="" id="{E98571B8-7802-434B-B149-E13573C42967}"/>
+                <a16:creationId xmlns="" xmlns:a16="http://schemas.microsoft.com/office/drawing/2014/main" id="{E98571B8-7802-434B-B149-E13573C42967}"/>
               </a:ext>
             </a:extLst>
           </p:cNvPr>
@@ -3932,7 +3936,7 @@
           <p:cNvPr id="3" name="Subtitle 2">
             <a:extLst>
               <a:ext uri="{FF2B5EF4-FFF2-40B4-BE49-F238E27FC236}">
-                <a16:creationId xmlns:a16="http://schemas.microsoft.com/office/drawing/2014/main" xmlns="" id="{5EA7E3DB-1D57-4E68-A809-4D1AC4124CCD}"/>
+                <a16:creationId xmlns="" xmlns:a16="http://schemas.microsoft.com/office/drawing/2014/main" id="{5EA7E3DB-1D57-4E68-A809-4D1AC4124CCD}"/>
               </a:ext>
             </a:extLst>
           </p:cNvPr>
@@ -3997,7 +4001,7 @@
           <p:cNvPr id="2" name="Title 1">
             <a:extLst>
               <a:ext uri="{FF2B5EF4-FFF2-40B4-BE49-F238E27FC236}">
-                <a16:creationId xmlns:a16="http://schemas.microsoft.com/office/drawing/2014/main" xmlns="" id="{C05A01AF-B615-45C0-94A3-E756C3674A53}"/>
+                <a16:creationId xmlns="" xmlns:a16="http://schemas.microsoft.com/office/drawing/2014/main" id="{C05A01AF-B615-45C0-94A3-E756C3674A53}"/>
               </a:ext>
             </a:extLst>
           </p:cNvPr>
@@ -4025,7 +4029,7 @@
           <p:cNvPr id="3" name="Content Placeholder 2">
             <a:extLst>
               <a:ext uri="{FF2B5EF4-FFF2-40B4-BE49-F238E27FC236}">
-                <a16:creationId xmlns:a16="http://schemas.microsoft.com/office/drawing/2014/main" xmlns="" id="{2D710FC4-CFF3-45C7-B5A8-A478831D0001}"/>
+                <a16:creationId xmlns="" xmlns:a16="http://schemas.microsoft.com/office/drawing/2014/main" id="{2D710FC4-CFF3-45C7-B5A8-A478831D0001}"/>
               </a:ext>
             </a:extLst>
           </p:cNvPr>
@@ -4156,7 +4160,7 @@
           <p:cNvPr id="2" name="Rectangle 1">
             <a:extLst>
               <a:ext uri="{FF2B5EF4-FFF2-40B4-BE49-F238E27FC236}">
-                <a16:creationId xmlns:a16="http://schemas.microsoft.com/office/drawing/2014/main" xmlns="" id="{A626BE00-405A-4B10-AE3D-72CC571AE9B0}"/>
+                <a16:creationId xmlns="" xmlns:a16="http://schemas.microsoft.com/office/drawing/2014/main" id="{A626BE00-405A-4B10-AE3D-72CC571AE9B0}"/>
               </a:ext>
             </a:extLst>
           </p:cNvPr>
@@ -4658,7 +4662,7 @@
           <p:cNvPr id="2" name="Rectangle 1">
             <a:extLst>
               <a:ext uri="{FF2B5EF4-FFF2-40B4-BE49-F238E27FC236}">
-                <a16:creationId xmlns:a16="http://schemas.microsoft.com/office/drawing/2014/main" xmlns="" id="{A626BE00-405A-4B10-AE3D-72CC571AE9B0}"/>
+                <a16:creationId xmlns="" xmlns:a16="http://schemas.microsoft.com/office/drawing/2014/main" id="{A626BE00-405A-4B10-AE3D-72CC571AE9B0}"/>
               </a:ext>
             </a:extLst>
           </p:cNvPr>
@@ -5205,7 +5209,7 @@
           <p:cNvPr id="2" name="Rectangle 1">
             <a:extLst>
               <a:ext uri="{FF2B5EF4-FFF2-40B4-BE49-F238E27FC236}">
-                <a16:creationId xmlns:a16="http://schemas.microsoft.com/office/drawing/2014/main" xmlns="" id="{A626BE00-405A-4B10-AE3D-72CC571AE9B0}"/>
+                <a16:creationId xmlns="" xmlns:a16="http://schemas.microsoft.com/office/drawing/2014/main" id="{A626BE00-405A-4B10-AE3D-72CC571AE9B0}"/>
               </a:ext>
             </a:extLst>
           </p:cNvPr>
@@ -5728,7 +5732,7 @@
           <p:cNvPr id="2" name="Rectangle 1">
             <a:extLst>
               <a:ext uri="{FF2B5EF4-FFF2-40B4-BE49-F238E27FC236}">
-                <a16:creationId xmlns:a16="http://schemas.microsoft.com/office/drawing/2014/main" xmlns="" id="{A626BE00-405A-4B10-AE3D-72CC571AE9B0}"/>
+                <a16:creationId xmlns="" xmlns:a16="http://schemas.microsoft.com/office/drawing/2014/main" id="{A626BE00-405A-4B10-AE3D-72CC571AE9B0}"/>
               </a:ext>
             </a:extLst>
           </p:cNvPr>
@@ -6188,7 +6192,7 @@
           <p:cNvPr id="2" name="Rectangle 1">
             <a:extLst>
               <a:ext uri="{FF2B5EF4-FFF2-40B4-BE49-F238E27FC236}">
-                <a16:creationId xmlns:a16="http://schemas.microsoft.com/office/drawing/2014/main" xmlns="" id="{A626BE00-405A-4B10-AE3D-72CC571AE9B0}"/>
+                <a16:creationId xmlns="" xmlns:a16="http://schemas.microsoft.com/office/drawing/2014/main" id="{A626BE00-405A-4B10-AE3D-72CC571AE9B0}"/>
               </a:ext>
             </a:extLst>
           </p:cNvPr>
@@ -6685,7 +6689,7 @@
           <p:cNvPr id="2" name="Rectangle 1">
             <a:extLst>
               <a:ext uri="{FF2B5EF4-FFF2-40B4-BE49-F238E27FC236}">
-                <a16:creationId xmlns:a16="http://schemas.microsoft.com/office/drawing/2014/main" xmlns="" id="{A626BE00-405A-4B10-AE3D-72CC571AE9B0}"/>
+                <a16:creationId xmlns="" xmlns:a16="http://schemas.microsoft.com/office/drawing/2014/main" id="{A626BE00-405A-4B10-AE3D-72CC571AE9B0}"/>
               </a:ext>
             </a:extLst>
           </p:cNvPr>
@@ -7096,6 +7100,111 @@
     <p:extLst>
       <p:ext uri="{BB962C8B-B14F-4D97-AF65-F5344CB8AC3E}">
         <p14:creationId xmlns:p14="http://schemas.microsoft.com/office/powerpoint/2010/main" val="3202117995"/>
+      </p:ext>
+    </p:extLst>
+  </p:cSld>
+  <p:clrMapOvr>
+    <a:masterClrMapping/>
+  </p:clrMapOvr>
+  <p:timing>
+    <p:tnLst>
+      <p:par>
+        <p:cTn id="1" dur="indefinite" restart="never" nodeType="tmRoot"/>
+      </p:par>
+    </p:tnLst>
+  </p:timing>
+</p:sld>
+</file>
+
+<file path=ppt/slides/slide9.xml><?xml version="1.0" encoding="utf-8"?>
+<p:sld xmlns:a="http://schemas.openxmlformats.org/drawingml/2006/main" xmlns:r="http://schemas.openxmlformats.org/officeDocument/2006/relationships" xmlns:p="http://schemas.openxmlformats.org/presentationml/2006/main">
+  <p:cSld>
+    <p:spTree>
+      <p:nvGrpSpPr>
+        <p:cNvPr id="1" name=""/>
+        <p:cNvGrpSpPr/>
+        <p:nvPr/>
+      </p:nvGrpSpPr>
+      <p:grpSpPr>
+        <a:xfrm>
+          <a:off x="0" y="0"/>
+          <a:ext cx="0" cy="0"/>
+          <a:chOff x="0" y="0"/>
+          <a:chExt cx="0" cy="0"/>
+        </a:xfrm>
+      </p:grpSpPr>
+      <p:sp>
+        <p:nvSpPr>
+          <p:cNvPr id="2" name="Title 1"/>
+          <p:cNvSpPr>
+            <a:spLocks noGrp="1"/>
+          </p:cNvSpPr>
+          <p:nvPr>
+            <p:ph type="title"/>
+          </p:nvPr>
+        </p:nvSpPr>
+        <p:spPr/>
+        <p:txBody>
+          <a:bodyPr/>
+          <a:lstStyle/>
+          <a:p>
+            <a:r>
+              <a:rPr lang="en-US" dirty="0" smtClean="0"/>
+              <a:t>Additional Information</a:t>
+            </a:r>
+            <a:endParaRPr lang="en-US" dirty="0"/>
+          </a:p>
+        </p:txBody>
+      </p:sp>
+      <p:sp>
+        <p:nvSpPr>
+          <p:cNvPr id="3" name="Content Placeholder 2"/>
+          <p:cNvSpPr>
+            <a:spLocks noGrp="1"/>
+          </p:cNvSpPr>
+          <p:nvPr>
+            <p:ph idx="1"/>
+          </p:nvPr>
+        </p:nvSpPr>
+        <p:spPr/>
+        <p:txBody>
+          <a:bodyPr/>
+          <a:lstStyle/>
+          <a:p>
+            <a:r>
+              <a:rPr lang="en-US" dirty="0" smtClean="0"/>
+              <a:t>Number of Screen Flows: 8</a:t>
+            </a:r>
+          </a:p>
+          <a:p>
+            <a:r>
+              <a:rPr lang="en-US" dirty="0" smtClean="0"/>
+              <a:t>Chosen Database: Firebase</a:t>
+            </a:r>
+          </a:p>
+          <a:p>
+            <a:r>
+              <a:rPr lang="en-US" dirty="0" err="1" smtClean="0"/>
+              <a:t>GitHub</a:t>
+            </a:r>
+            <a:r>
+              <a:rPr lang="en-US" dirty="0" smtClean="0"/>
+              <a:t> Link: </a:t>
+            </a:r>
+            <a:r>
+              <a:rPr lang="en-US" dirty="0" smtClean="0">
+                <a:hlinkClick r:id="rId2"/>
+              </a:rPr>
+              <a:t>Project Aero Flights</a:t>
+            </a:r>
+            <a:endParaRPr lang="en-US" dirty="0"/>
+          </a:p>
+        </p:txBody>
+      </p:sp>
+    </p:spTree>
+    <p:extLst>
+      <p:ext uri="{BB962C8B-B14F-4D97-AF65-F5344CB8AC3E}">
+        <p14:creationId xmlns:p14="http://schemas.microsoft.com/office/powerpoint/2010/main" val="3539673659"/>
       </p:ext>
     </p:extLst>
   </p:cSld>

</xml_diff>

<commit_message>
added the slides and mockup for the search bar page and the main flights page
</commit_message>
<xml_diff>
--- a/Aero_Flights_Deliverable_0.pptx
+++ b/Aero_Flights_Deliverable_0.pptx
@@ -5,10 +5,10 @@
     <p:sldMasterId id="2147483840" r:id="rId1"/>
   </p:sldMasterIdLst>
   <p:notesMasterIdLst>
-    <p:notesMasterId r:id="rId11"/>
+    <p:notesMasterId r:id="rId13"/>
   </p:notesMasterIdLst>
   <p:handoutMasterIdLst>
-    <p:handoutMasterId r:id="rId12"/>
+    <p:handoutMasterId r:id="rId14"/>
   </p:handoutMasterIdLst>
   <p:sldIdLst>
     <p:sldId id="256" r:id="rId2"/>
@@ -18,8 +18,10 @@
     <p:sldId id="261" r:id="rId6"/>
     <p:sldId id="262" r:id="rId7"/>
     <p:sldId id="263" r:id="rId8"/>
-    <p:sldId id="264" r:id="rId9"/>
-    <p:sldId id="265" r:id="rId10"/>
+    <p:sldId id="266" r:id="rId9"/>
+    <p:sldId id="264" r:id="rId10"/>
+    <p:sldId id="267" r:id="rId11"/>
+    <p:sldId id="265" r:id="rId12"/>
   </p:sldIdLst>
   <p:sldSz cx="12192000" cy="6858000"/>
   <p:notesSz cx="6858000" cy="9144000"/>
@@ -440,38 +442,37 @@
           <a:p>
             <a:pPr lvl="0"/>
             <a:r>
-              <a:rPr lang="en-US" smtClean="0"/>
+              <a:rPr lang="en-US"/>
               <a:t>Click to edit Master text styles</a:t>
             </a:r>
           </a:p>
           <a:p>
             <a:pPr lvl="1"/>
             <a:r>
-              <a:rPr lang="en-US" smtClean="0"/>
+              <a:rPr lang="en-US"/>
               <a:t>Second level</a:t>
             </a:r>
           </a:p>
           <a:p>
             <a:pPr lvl="2"/>
             <a:r>
-              <a:rPr lang="en-US" smtClean="0"/>
+              <a:rPr lang="en-US"/>
               <a:t>Third level</a:t>
             </a:r>
           </a:p>
           <a:p>
             <a:pPr lvl="3"/>
             <a:r>
-              <a:rPr lang="en-US" smtClean="0"/>
+              <a:rPr lang="en-US"/>
               <a:t>Fourth level</a:t>
             </a:r>
           </a:p>
           <a:p>
             <a:pPr lvl="4"/>
             <a:r>
-              <a:rPr lang="en-US" smtClean="0"/>
+              <a:rPr lang="en-US"/>
               <a:t>Fifth level</a:t>
             </a:r>
-            <a:endParaRPr lang="en-US"/>
           </a:p>
         </p:txBody>
       </p:sp>
@@ -2905,13 +2906,6 @@
   <p:clrMapOvr>
     <a:masterClrMapping/>
   </p:clrMapOvr>
-  <p:timing>
-    <p:tnLst>
-      <p:par>
-        <p:cTn id="1" dur="indefinite" restart="never" nodeType="tmRoot"/>
-      </p:par>
-    </p:tnLst>
-  </p:timing>
 </p:sldLayout>
 </file>
 
@@ -3906,7 +3900,7 @@
           <p:cNvPr id="2" name="Title 1">
             <a:extLst>
               <a:ext uri="{FF2B5EF4-FFF2-40B4-BE49-F238E27FC236}">
-                <a16:creationId xmlns="" xmlns:a16="http://schemas.microsoft.com/office/drawing/2014/main" id="{E98571B8-7802-434B-B149-E13573C42967}"/>
+                <a16:creationId xmlns:a16="http://schemas.microsoft.com/office/drawing/2014/main" id="{E98571B8-7802-434B-B149-E13573C42967}"/>
               </a:ext>
             </a:extLst>
           </p:cNvPr>
@@ -3936,7 +3930,7 @@
           <p:cNvPr id="3" name="Subtitle 2">
             <a:extLst>
               <a:ext uri="{FF2B5EF4-FFF2-40B4-BE49-F238E27FC236}">
-                <a16:creationId xmlns="" xmlns:a16="http://schemas.microsoft.com/office/drawing/2014/main" id="{5EA7E3DB-1D57-4E68-A809-4D1AC4124CCD}"/>
+                <a16:creationId xmlns:a16="http://schemas.microsoft.com/office/drawing/2014/main" id="{5EA7E3DB-1D57-4E68-A809-4D1AC4124CCD}"/>
               </a:ext>
             </a:extLst>
           </p:cNvPr>
@@ -3969,13 +3963,325 @@
   <p:clrMapOvr>
     <a:masterClrMapping/>
   </p:clrMapOvr>
-  <p:timing>
-    <p:tnLst>
-      <p:par>
-        <p:cTn id="1" dur="indefinite" restart="never" nodeType="tmRoot"/>
-      </p:par>
-    </p:tnLst>
-  </p:timing>
+</p:sld>
+</file>
+
+<file path=ppt/slides/slide10.xml><?xml version="1.0" encoding="utf-8"?>
+<p:sld xmlns:a="http://schemas.openxmlformats.org/drawingml/2006/main" xmlns:r="http://schemas.openxmlformats.org/officeDocument/2006/relationships" xmlns:p="http://schemas.openxmlformats.org/presentationml/2006/main">
+  <p:cSld>
+    <p:spTree>
+      <p:nvGrpSpPr>
+        <p:cNvPr id="1" name=""/>
+        <p:cNvGrpSpPr/>
+        <p:nvPr/>
+      </p:nvGrpSpPr>
+      <p:grpSpPr>
+        <a:xfrm>
+          <a:off x="0" y="0"/>
+          <a:ext cx="0" cy="0"/>
+          <a:chOff x="0" y="0"/>
+          <a:chExt cx="0" cy="0"/>
+        </a:xfrm>
+      </p:grpSpPr>
+      <p:pic>
+        <p:nvPicPr>
+          <p:cNvPr id="3" name="Picture 2">
+            <a:extLst>
+              <a:ext uri="{FF2B5EF4-FFF2-40B4-BE49-F238E27FC236}">
+                <a16:creationId xmlns:a16="http://schemas.microsoft.com/office/drawing/2014/main" id="{E52EF390-DD06-03DD-0BD8-6F44A70D5463}"/>
+              </a:ext>
+            </a:extLst>
+          </p:cNvPr>
+          <p:cNvPicPr>
+            <a:picLocks noChangeAspect="1"/>
+          </p:cNvPicPr>
+          <p:nvPr/>
+        </p:nvPicPr>
+        <p:blipFill>
+          <a:blip r:embed="rId2"/>
+          <a:stretch>
+            <a:fillRect/>
+          </a:stretch>
+        </p:blipFill>
+        <p:spPr>
+          <a:xfrm>
+            <a:off x="293148" y="1530220"/>
+            <a:ext cx="2719016" cy="4991878"/>
+          </a:xfrm>
+          <a:prstGeom prst="rect">
+            <a:avLst/>
+          </a:prstGeom>
+        </p:spPr>
+      </p:pic>
+      <p:sp>
+        <p:nvSpPr>
+          <p:cNvPr id="4" name="Rectangle 3">
+            <a:extLst>
+              <a:ext uri="{FF2B5EF4-FFF2-40B4-BE49-F238E27FC236}">
+                <a16:creationId xmlns:a16="http://schemas.microsoft.com/office/drawing/2014/main" id="{4FE56A71-558A-14A2-D451-5F04130FB961}"/>
+              </a:ext>
+            </a:extLst>
+          </p:cNvPr>
+          <p:cNvSpPr/>
+          <p:nvPr/>
+        </p:nvSpPr>
+        <p:spPr>
+          <a:xfrm>
+            <a:off x="0" y="109057"/>
+            <a:ext cx="4093827" cy="1073791"/>
+          </a:xfrm>
+          <a:prstGeom prst="rect">
+            <a:avLst/>
+          </a:prstGeom>
+          <a:ln>
+            <a:solidFill>
+              <a:schemeClr val="bg1"/>
+            </a:solidFill>
+          </a:ln>
+        </p:spPr>
+        <p:style>
+          <a:lnRef idx="2">
+            <a:schemeClr val="accent1">
+              <a:shade val="50000"/>
+            </a:schemeClr>
+          </a:lnRef>
+          <a:fillRef idx="1">
+            <a:schemeClr val="accent1"/>
+          </a:fillRef>
+          <a:effectRef idx="0">
+            <a:schemeClr val="accent1"/>
+          </a:effectRef>
+          <a:fontRef idx="minor">
+            <a:schemeClr val="lt1"/>
+          </a:fontRef>
+        </p:style>
+        <p:txBody>
+          <a:bodyPr rtlCol="0" anchor="ctr"/>
+          <a:lstStyle/>
+          <a:p>
+            <a:pPr algn="ctr"/>
+            <a:r>
+              <a:rPr lang="en-US" sz="3600" spc="-60" dirty="0">
+                <a:solidFill>
+                  <a:srgbClr val="FFFFFF"/>
+                </a:solidFill>
+                <a:latin typeface="+mj-lt"/>
+                <a:ea typeface="+mj-ea"/>
+                <a:cs typeface="+mj-cs"/>
+              </a:rPr>
+              <a:t>Search Bar</a:t>
+            </a:r>
+          </a:p>
+        </p:txBody>
+      </p:sp>
+      <p:sp>
+        <p:nvSpPr>
+          <p:cNvPr id="6" name="TextBox 5">
+            <a:extLst>
+              <a:ext uri="{FF2B5EF4-FFF2-40B4-BE49-F238E27FC236}">
+                <a16:creationId xmlns:a16="http://schemas.microsoft.com/office/drawing/2014/main" id="{7DC632F1-DAC9-3762-B0D5-5EB1F45A30D9}"/>
+              </a:ext>
+            </a:extLst>
+          </p:cNvPr>
+          <p:cNvSpPr txBox="1"/>
+          <p:nvPr/>
+        </p:nvSpPr>
+        <p:spPr>
+          <a:xfrm>
+            <a:off x="4356285" y="2413597"/>
+            <a:ext cx="6097554" cy="880369"/>
+          </a:xfrm>
+          <a:prstGeom prst="rect">
+            <a:avLst/>
+          </a:prstGeom>
+          <a:noFill/>
+        </p:spPr>
+        <p:txBody>
+          <a:bodyPr wrap="square">
+            <a:spAutoFit/>
+          </a:bodyPr>
+          <a:lstStyle/>
+          <a:p>
+            <a:pPr>
+              <a:lnSpc>
+                <a:spcPct val="150000"/>
+              </a:lnSpc>
+              <a:buFont typeface="Wingdings" panose="05000000000000000000" pitchFamily="2" charset="2"/>
+              <a:buChar char="Ø"/>
+            </a:pPr>
+            <a:r>
+              <a:rPr lang="en-US" dirty="0"/>
+              <a:t> In the search page, you will be able to search for a specific flight based on the destination, arrival, price, etc.</a:t>
+            </a:r>
+          </a:p>
+        </p:txBody>
+      </p:sp>
+      <p:pic>
+        <p:nvPicPr>
+          <p:cNvPr id="10" name="Picture 9" descr="Background pattern&#10;&#10;Description automatically generated">
+            <a:extLst>
+              <a:ext uri="{FF2B5EF4-FFF2-40B4-BE49-F238E27FC236}">
+                <a16:creationId xmlns:a16="http://schemas.microsoft.com/office/drawing/2014/main" id="{E8820601-D60A-B3F6-2650-791F12E3A475}"/>
+              </a:ext>
+            </a:extLst>
+          </p:cNvPr>
+          <p:cNvPicPr>
+            <a:picLocks noChangeAspect="1"/>
+          </p:cNvPicPr>
+          <p:nvPr/>
+        </p:nvPicPr>
+        <p:blipFill rotWithShape="1">
+          <a:blip r:embed="rId3"/>
+          <a:srcRect l="8405" t="36506" r="8607" b="35591"/>
+          <a:stretch/>
+        </p:blipFill>
+        <p:spPr>
+          <a:xfrm>
+            <a:off x="481762" y="2461682"/>
+            <a:ext cx="2382736" cy="464871"/>
+          </a:xfrm>
+          <a:prstGeom prst="rect">
+            <a:avLst/>
+          </a:prstGeom>
+        </p:spPr>
+      </p:pic>
+      <p:pic>
+        <p:nvPicPr>
+          <p:cNvPr id="12" name="Picture 11">
+            <a:extLst>
+              <a:ext uri="{FF2B5EF4-FFF2-40B4-BE49-F238E27FC236}">
+                <a16:creationId xmlns:a16="http://schemas.microsoft.com/office/drawing/2014/main" id="{CBD1B3C5-7D2D-08E0-B846-02C176112B31}"/>
+              </a:ext>
+            </a:extLst>
+          </p:cNvPr>
+          <p:cNvPicPr>
+            <a:picLocks noChangeAspect="1"/>
+          </p:cNvPicPr>
+          <p:nvPr/>
+        </p:nvPicPr>
+        <p:blipFill>
+          <a:blip r:embed="rId4"/>
+          <a:stretch>
+            <a:fillRect/>
+          </a:stretch>
+        </p:blipFill>
+        <p:spPr>
+          <a:xfrm>
+            <a:off x="481762" y="3041490"/>
+            <a:ext cx="2286319" cy="2753109"/>
+          </a:xfrm>
+          <a:prstGeom prst="rect">
+            <a:avLst/>
+          </a:prstGeom>
+        </p:spPr>
+      </p:pic>
+    </p:spTree>
+    <p:extLst>
+      <p:ext uri="{BB962C8B-B14F-4D97-AF65-F5344CB8AC3E}">
+        <p14:creationId xmlns:p14="http://schemas.microsoft.com/office/powerpoint/2010/main" val="3867775663"/>
+      </p:ext>
+    </p:extLst>
+  </p:cSld>
+  <p:clrMapOvr>
+    <a:masterClrMapping/>
+  </p:clrMapOvr>
+</p:sld>
+</file>
+
+<file path=ppt/slides/slide11.xml><?xml version="1.0" encoding="utf-8"?>
+<p:sld xmlns:a="http://schemas.openxmlformats.org/drawingml/2006/main" xmlns:r="http://schemas.openxmlformats.org/officeDocument/2006/relationships" xmlns:p="http://schemas.openxmlformats.org/presentationml/2006/main">
+  <p:cSld>
+    <p:spTree>
+      <p:nvGrpSpPr>
+        <p:cNvPr id="1" name=""/>
+        <p:cNvGrpSpPr/>
+        <p:nvPr/>
+      </p:nvGrpSpPr>
+      <p:grpSpPr>
+        <a:xfrm>
+          <a:off x="0" y="0"/>
+          <a:ext cx="0" cy="0"/>
+          <a:chOff x="0" y="0"/>
+          <a:chExt cx="0" cy="0"/>
+        </a:xfrm>
+      </p:grpSpPr>
+      <p:sp>
+        <p:nvSpPr>
+          <p:cNvPr id="2" name="Title 1"/>
+          <p:cNvSpPr>
+            <a:spLocks noGrp="1"/>
+          </p:cNvSpPr>
+          <p:nvPr>
+            <p:ph type="title"/>
+          </p:nvPr>
+        </p:nvSpPr>
+        <p:spPr/>
+        <p:txBody>
+          <a:bodyPr/>
+          <a:lstStyle/>
+          <a:p>
+            <a:r>
+              <a:rPr lang="en-US" dirty="0"/>
+              <a:t>Additional Information</a:t>
+            </a:r>
+          </a:p>
+        </p:txBody>
+      </p:sp>
+      <p:sp>
+        <p:nvSpPr>
+          <p:cNvPr id="3" name="Content Placeholder 2"/>
+          <p:cNvSpPr>
+            <a:spLocks noGrp="1"/>
+          </p:cNvSpPr>
+          <p:nvPr>
+            <p:ph idx="1"/>
+          </p:nvPr>
+        </p:nvSpPr>
+        <p:spPr/>
+        <p:txBody>
+          <a:bodyPr/>
+          <a:lstStyle/>
+          <a:p>
+            <a:r>
+              <a:rPr lang="en-US" dirty="0"/>
+              <a:t>Number of Screen Flows: 8</a:t>
+            </a:r>
+          </a:p>
+          <a:p>
+            <a:r>
+              <a:rPr lang="en-US" dirty="0"/>
+              <a:t>Chosen Database: Firebase</a:t>
+            </a:r>
+          </a:p>
+          <a:p>
+            <a:r>
+              <a:rPr lang="en-US" dirty="0" err="1"/>
+              <a:t>GitHub</a:t>
+            </a:r>
+            <a:r>
+              <a:rPr lang="en-US" dirty="0"/>
+              <a:t> Link: </a:t>
+            </a:r>
+            <a:r>
+              <a:rPr lang="en-US" dirty="0">
+                <a:hlinkClick r:id="rId2"/>
+              </a:rPr>
+              <a:t>Project Aero Flights</a:t>
+            </a:r>
+            <a:endParaRPr lang="en-US" dirty="0"/>
+          </a:p>
+        </p:txBody>
+      </p:sp>
+    </p:spTree>
+    <p:extLst>
+      <p:ext uri="{BB962C8B-B14F-4D97-AF65-F5344CB8AC3E}">
+        <p14:creationId xmlns:p14="http://schemas.microsoft.com/office/powerpoint/2010/main" val="3539673659"/>
+      </p:ext>
+    </p:extLst>
+  </p:cSld>
+  <p:clrMapOvr>
+    <a:masterClrMapping/>
+  </p:clrMapOvr>
 </p:sld>
 </file>
 
@@ -4001,7 +4307,7 @@
           <p:cNvPr id="2" name="Title 1">
             <a:extLst>
               <a:ext uri="{FF2B5EF4-FFF2-40B4-BE49-F238E27FC236}">
-                <a16:creationId xmlns="" xmlns:a16="http://schemas.microsoft.com/office/drawing/2014/main" id="{C05A01AF-B615-45C0-94A3-E756C3674A53}"/>
+                <a16:creationId xmlns:a16="http://schemas.microsoft.com/office/drawing/2014/main" id="{C05A01AF-B615-45C0-94A3-E756C3674A53}"/>
               </a:ext>
             </a:extLst>
           </p:cNvPr>
@@ -4029,7 +4335,7 @@
           <p:cNvPr id="3" name="Content Placeholder 2">
             <a:extLst>
               <a:ext uri="{FF2B5EF4-FFF2-40B4-BE49-F238E27FC236}">
-                <a16:creationId xmlns="" xmlns:a16="http://schemas.microsoft.com/office/drawing/2014/main" id="{2D710FC4-CFF3-45C7-B5A8-A478831D0001}"/>
+                <a16:creationId xmlns:a16="http://schemas.microsoft.com/office/drawing/2014/main" id="{2D710FC4-CFF3-45C7-B5A8-A478831D0001}"/>
               </a:ext>
             </a:extLst>
           </p:cNvPr>
@@ -4128,13 +4434,6 @@
   <p:clrMapOvr>
     <a:masterClrMapping/>
   </p:clrMapOvr>
-  <p:timing>
-    <p:tnLst>
-      <p:par>
-        <p:cTn id="1" dur="indefinite" restart="never" nodeType="tmRoot"/>
-      </p:par>
-    </p:tnLst>
-  </p:timing>
 </p:sld>
 </file>
 
@@ -4160,7 +4459,7 @@
           <p:cNvPr id="2" name="Rectangle 1">
             <a:extLst>
               <a:ext uri="{FF2B5EF4-FFF2-40B4-BE49-F238E27FC236}">
-                <a16:creationId xmlns="" xmlns:a16="http://schemas.microsoft.com/office/drawing/2014/main" id="{A626BE00-405A-4B10-AE3D-72CC571AE9B0}"/>
+                <a16:creationId xmlns:a16="http://schemas.microsoft.com/office/drawing/2014/main" id="{A626BE00-405A-4B10-AE3D-72CC571AE9B0}"/>
               </a:ext>
             </a:extLst>
           </p:cNvPr>
@@ -4203,7 +4502,7 @@
           <a:p>
             <a:pPr algn="ctr"/>
             <a:r>
-              <a:rPr lang="en-US" sz="3600" spc="-60" dirty="0" smtClean="0">
+              <a:rPr lang="en-US" sz="3600" spc="-60" dirty="0">
                 <a:solidFill>
                   <a:srgbClr val="FFFFFF"/>
                 </a:solidFill>
@@ -4213,14 +4512,6 @@
               </a:rPr>
               <a:t>Mock-up</a:t>
             </a:r>
-            <a:endParaRPr lang="en-US" sz="3600" spc="-60" dirty="0">
-              <a:solidFill>
-                <a:srgbClr val="FFFFFF"/>
-              </a:solidFill>
-              <a:latin typeface="+mj-lt"/>
-              <a:ea typeface="+mj-ea"/>
-              <a:cs typeface="+mj-cs"/>
-            </a:endParaRPr>
           </a:p>
         </p:txBody>
       </p:sp>
@@ -4448,7 +4739,7 @@
           <a:p>
             <a:pPr algn="ctr"/>
             <a:r>
-              <a:rPr lang="en-US" sz="1100" dirty="0" smtClean="0">
+              <a:rPr lang="en-US" sz="1100" dirty="0">
                 <a:solidFill>
                   <a:schemeClr val="bg1"/>
                 </a:solidFill>
@@ -4525,10 +4816,9 @@
           <a:p>
             <a:pPr algn="ctr"/>
             <a:r>
-              <a:rPr lang="en-US" dirty="0" smtClean="0"/>
+              <a:rPr lang="en-US" dirty="0"/>
               <a:t>Map</a:t>
             </a:r>
-            <a:endParaRPr lang="en-US" dirty="0"/>
           </a:p>
         </p:txBody>
       </p:sp>
@@ -4569,10 +4859,9 @@
           <a:p>
             <a:pPr algn="ctr"/>
             <a:r>
-              <a:rPr lang="en-US" dirty="0" smtClean="0"/>
+              <a:rPr lang="en-US" dirty="0"/>
               <a:t>Search</a:t>
             </a:r>
-            <a:endParaRPr lang="en-US" dirty="0"/>
           </a:p>
         </p:txBody>
       </p:sp>
@@ -4613,10 +4902,9 @@
           <a:p>
             <a:pPr algn="ctr"/>
             <a:r>
-              <a:rPr lang="en-US" dirty="0" smtClean="0"/>
+              <a:rPr lang="en-US" dirty="0"/>
               <a:t>Flight</a:t>
             </a:r>
-            <a:endParaRPr lang="en-US" dirty="0"/>
           </a:p>
         </p:txBody>
       </p:sp>
@@ -4630,13 +4918,6 @@
   <p:clrMapOvr>
     <a:masterClrMapping/>
   </p:clrMapOvr>
-  <p:timing>
-    <p:tnLst>
-      <p:par>
-        <p:cTn id="1" dur="indefinite" restart="never" nodeType="tmRoot"/>
-      </p:par>
-    </p:tnLst>
-  </p:timing>
 </p:sld>
 </file>
 
@@ -4662,7 +4943,7 @@
           <p:cNvPr id="2" name="Rectangle 1">
             <a:extLst>
               <a:ext uri="{FF2B5EF4-FFF2-40B4-BE49-F238E27FC236}">
-                <a16:creationId xmlns="" xmlns:a16="http://schemas.microsoft.com/office/drawing/2014/main" id="{A626BE00-405A-4B10-AE3D-72CC571AE9B0}"/>
+                <a16:creationId xmlns:a16="http://schemas.microsoft.com/office/drawing/2014/main" id="{A626BE00-405A-4B10-AE3D-72CC571AE9B0}"/>
               </a:ext>
             </a:extLst>
           </p:cNvPr>
@@ -4705,7 +4986,7 @@
           <a:p>
             <a:pPr algn="ctr"/>
             <a:r>
-              <a:rPr lang="en-US" sz="3600" spc="-60" dirty="0" smtClean="0">
+              <a:rPr lang="en-US" sz="3600" spc="-60" dirty="0">
                 <a:solidFill>
                   <a:srgbClr val="FFFFFF"/>
                 </a:solidFill>
@@ -4715,14 +4996,6 @@
               </a:rPr>
               <a:t>Launch</a:t>
             </a:r>
-            <a:endParaRPr lang="en-US" sz="3600" spc="-60" dirty="0">
-              <a:solidFill>
-                <a:srgbClr val="FFFFFF"/>
-              </a:solidFill>
-              <a:latin typeface="+mj-lt"/>
-              <a:ea typeface="+mj-ea"/>
-              <a:cs typeface="+mj-cs"/>
-            </a:endParaRPr>
           </a:p>
         </p:txBody>
       </p:sp>
@@ -4820,7 +5093,7 @@
           <a:p>
             <a:pPr algn="ctr"/>
             <a:r>
-              <a:rPr lang="en-US" dirty="0" smtClean="0">
+              <a:rPr lang="en-US" dirty="0">
                 <a:solidFill>
                   <a:schemeClr val="bg1"/>
                 </a:solidFill>
@@ -5106,10 +5379,9 @@
               <a:buChar char="Ø"/>
             </a:pPr>
             <a:r>
-              <a:rPr lang="en-US" dirty="0" smtClean="0"/>
+              <a:rPr lang="en-US" dirty="0"/>
               <a:t> Launch Page of our app showcasing custom-made logo in the middle and name at the bottom.</a:t>
             </a:r>
-            <a:endParaRPr lang="en-US" dirty="0"/>
           </a:p>
         </p:txBody>
       </p:sp>
@@ -5177,13 +5449,6 @@
   <p:clrMapOvr>
     <a:masterClrMapping/>
   </p:clrMapOvr>
-  <p:timing>
-    <p:tnLst>
-      <p:par>
-        <p:cTn id="1" dur="indefinite" restart="never" nodeType="tmRoot"/>
-      </p:par>
-    </p:tnLst>
-  </p:timing>
 </p:sld>
 </file>
 
@@ -5209,7 +5474,7 @@
           <p:cNvPr id="2" name="Rectangle 1">
             <a:extLst>
               <a:ext uri="{FF2B5EF4-FFF2-40B4-BE49-F238E27FC236}">
-                <a16:creationId xmlns="" xmlns:a16="http://schemas.microsoft.com/office/drawing/2014/main" id="{A626BE00-405A-4B10-AE3D-72CC571AE9B0}"/>
+                <a16:creationId xmlns:a16="http://schemas.microsoft.com/office/drawing/2014/main" id="{A626BE00-405A-4B10-AE3D-72CC571AE9B0}"/>
               </a:ext>
             </a:extLst>
           </p:cNvPr>
@@ -5252,7 +5517,7 @@
           <a:p>
             <a:pPr algn="ctr"/>
             <a:r>
-              <a:rPr lang="en-US" sz="3600" spc="-60" dirty="0" smtClean="0">
+              <a:rPr lang="en-US" sz="3600" spc="-60" dirty="0">
                 <a:solidFill>
                   <a:srgbClr val="FFFFFF"/>
                 </a:solidFill>
@@ -5262,14 +5527,6 @@
               </a:rPr>
               <a:t>Login</a:t>
             </a:r>
-            <a:endParaRPr lang="en-US" sz="3600" spc="-60" dirty="0">
-              <a:solidFill>
-                <a:srgbClr val="FFFFFF"/>
-              </a:solidFill>
-              <a:latin typeface="+mj-lt"/>
-              <a:ea typeface="+mj-ea"/>
-              <a:cs typeface="+mj-cs"/>
-            </a:endParaRPr>
           </a:p>
         </p:txBody>
       </p:sp>
@@ -5544,13 +5801,8 @@
             </a:pPr>
             <a:r>
               <a:rPr lang="en-US" dirty="0"/>
-              <a:t> </a:t>
-            </a:r>
-            <a:r>
-              <a:rPr lang="en-US" dirty="0" smtClean="0"/>
-              <a:t>Sign In to your account with matching email and password. If they do not have an account, they can Register.</a:t>
-            </a:r>
-            <a:endParaRPr lang="en-US" dirty="0"/>
+              <a:t> Sign In to your account with matching email and password. If they do not have an account, they can Register.</a:t>
+            </a:r>
           </a:p>
         </p:txBody>
       </p:sp>
@@ -5659,13 +5911,6 @@
   <p:clrMapOvr>
     <a:masterClrMapping/>
   </p:clrMapOvr>
-  <p:timing>
-    <p:tnLst>
-      <p:par>
-        <p:cTn id="1" dur="indefinite" restart="never" nodeType="tmRoot"/>
-      </p:par>
-    </p:tnLst>
-  </p:timing>
 </p:sld>
 </file>
 
@@ -5732,7 +5977,7 @@
           <p:cNvPr id="2" name="Rectangle 1">
             <a:extLst>
               <a:ext uri="{FF2B5EF4-FFF2-40B4-BE49-F238E27FC236}">
-                <a16:creationId xmlns="" xmlns:a16="http://schemas.microsoft.com/office/drawing/2014/main" id="{A626BE00-405A-4B10-AE3D-72CC571AE9B0}"/>
+                <a16:creationId xmlns:a16="http://schemas.microsoft.com/office/drawing/2014/main" id="{A626BE00-405A-4B10-AE3D-72CC571AE9B0}"/>
               </a:ext>
             </a:extLst>
           </p:cNvPr>
@@ -5775,7 +6020,7 @@
           <a:p>
             <a:pPr algn="ctr"/>
             <a:r>
-              <a:rPr lang="en-US" sz="3600" spc="-60" dirty="0" smtClean="0">
+              <a:rPr lang="en-US" sz="3600" spc="-60" dirty="0">
                 <a:solidFill>
                   <a:srgbClr val="FFFFFF"/>
                 </a:solidFill>
@@ -5785,14 +6030,6 @@
               </a:rPr>
               <a:t>Register</a:t>
             </a:r>
-            <a:endParaRPr lang="en-US" sz="3600" spc="-60" dirty="0">
-              <a:solidFill>
-                <a:srgbClr val="FFFFFF"/>
-              </a:solidFill>
-              <a:latin typeface="+mj-lt"/>
-              <a:ea typeface="+mj-ea"/>
-              <a:cs typeface="+mj-cs"/>
-            </a:endParaRPr>
           </a:p>
         </p:txBody>
       </p:sp>
@@ -6066,7 +6303,7 @@
               <a:buChar char="Ø"/>
             </a:pPr>
             <a:r>
-              <a:rPr lang="en-US" dirty="0" smtClean="0"/>
+              <a:rPr lang="en-US" dirty="0"/>
               <a:t> Register and create a new account if they do not have one already. If they already have an account, they can log in. This information is later stored in our Firebase database.</a:t>
             </a:r>
           </a:p>
@@ -6136,13 +6373,6 @@
   <p:clrMapOvr>
     <a:masterClrMapping/>
   </p:clrMapOvr>
-  <p:timing>
-    <p:tnLst>
-      <p:par>
-        <p:cTn id="1" dur="indefinite" restart="never" nodeType="tmRoot"/>
-      </p:par>
-    </p:tnLst>
-  </p:timing>
 </p:sld>
 </file>
 
@@ -6192,7 +6422,7 @@
           <p:cNvPr id="2" name="Rectangle 1">
             <a:extLst>
               <a:ext uri="{FF2B5EF4-FFF2-40B4-BE49-F238E27FC236}">
-                <a16:creationId xmlns="" xmlns:a16="http://schemas.microsoft.com/office/drawing/2014/main" id="{A626BE00-405A-4B10-AE3D-72CC571AE9B0}"/>
+                <a16:creationId xmlns:a16="http://schemas.microsoft.com/office/drawing/2014/main" id="{A626BE00-405A-4B10-AE3D-72CC571AE9B0}"/>
               </a:ext>
             </a:extLst>
           </p:cNvPr>
@@ -6235,7 +6465,7 @@
           <a:p>
             <a:pPr algn="ctr"/>
             <a:r>
-              <a:rPr lang="en-US" sz="3600" spc="-60" dirty="0" smtClean="0">
+              <a:rPr lang="en-US" sz="3600" spc="-60" dirty="0">
                 <a:solidFill>
                   <a:srgbClr val="FFFFFF"/>
                 </a:solidFill>
@@ -6245,14 +6475,6 @@
               </a:rPr>
               <a:t>Profile</a:t>
             </a:r>
-            <a:endParaRPr lang="en-US" sz="3600" spc="-60" dirty="0">
-              <a:solidFill>
-                <a:srgbClr val="FFFFFF"/>
-              </a:solidFill>
-              <a:latin typeface="+mj-lt"/>
-              <a:ea typeface="+mj-ea"/>
-              <a:cs typeface="+mj-cs"/>
-            </a:endParaRPr>
           </a:p>
         </p:txBody>
       </p:sp>
@@ -6527,21 +6749,8 @@
             </a:pPr>
             <a:r>
               <a:rPr lang="en-US" dirty="0"/>
-              <a:t> </a:t>
-            </a:r>
-            <a:r>
-              <a:rPr lang="en-US" dirty="0" smtClean="0"/>
-              <a:t>View and </a:t>
-            </a:r>
-            <a:r>
-              <a:rPr lang="en-US" dirty="0"/>
-              <a:t>E</a:t>
-            </a:r>
-            <a:r>
-              <a:rPr lang="en-US" dirty="0" smtClean="0"/>
-              <a:t>dit profile. Users can modify their existing username, email or password. Additionally, they can upload a profile picture.</a:t>
-            </a:r>
-            <a:endParaRPr lang="en-US" dirty="0"/>
+              <a:t> View and Edit profile. Users can modify their existing username, email or password. Additionally, they can upload a profile picture.</a:t>
+            </a:r>
           </a:p>
         </p:txBody>
       </p:sp>
@@ -6609,17 +6818,291 @@
   <p:clrMapOvr>
     <a:masterClrMapping/>
   </p:clrMapOvr>
-  <p:timing>
-    <p:tnLst>
-      <p:par>
-        <p:cTn id="1" dur="indefinite" restart="never" nodeType="tmRoot"/>
-      </p:par>
-    </p:tnLst>
-  </p:timing>
 </p:sld>
 </file>
 
 <file path=ppt/slides/slide8.xml><?xml version="1.0" encoding="utf-8"?>
+<p:sld xmlns:a="http://schemas.openxmlformats.org/drawingml/2006/main" xmlns:r="http://schemas.openxmlformats.org/officeDocument/2006/relationships" xmlns:p="http://schemas.openxmlformats.org/presentationml/2006/main">
+  <p:cSld>
+    <p:spTree>
+      <p:nvGrpSpPr>
+        <p:cNvPr id="1" name=""/>
+        <p:cNvGrpSpPr/>
+        <p:nvPr/>
+      </p:nvGrpSpPr>
+      <p:grpSpPr>
+        <a:xfrm>
+          <a:off x="0" y="0"/>
+          <a:ext cx="0" cy="0"/>
+          <a:chOff x="0" y="0"/>
+          <a:chExt cx="0" cy="0"/>
+        </a:xfrm>
+      </p:grpSpPr>
+      <p:sp>
+        <p:nvSpPr>
+          <p:cNvPr id="2" name="Rectangle 1">
+            <a:extLst>
+              <a:ext uri="{FF2B5EF4-FFF2-40B4-BE49-F238E27FC236}">
+                <a16:creationId xmlns:a16="http://schemas.microsoft.com/office/drawing/2014/main" id="{F19E7644-FFBD-35F6-79DA-3407018C49CF}"/>
+              </a:ext>
+            </a:extLst>
+          </p:cNvPr>
+          <p:cNvSpPr/>
+          <p:nvPr/>
+        </p:nvSpPr>
+        <p:spPr>
+          <a:xfrm>
+            <a:off x="0" y="109057"/>
+            <a:ext cx="4093827" cy="1073791"/>
+          </a:xfrm>
+          <a:prstGeom prst="rect">
+            <a:avLst/>
+          </a:prstGeom>
+          <a:ln>
+            <a:solidFill>
+              <a:schemeClr val="bg1"/>
+            </a:solidFill>
+          </a:ln>
+        </p:spPr>
+        <p:style>
+          <a:lnRef idx="2">
+            <a:schemeClr val="accent1">
+              <a:shade val="50000"/>
+            </a:schemeClr>
+          </a:lnRef>
+          <a:fillRef idx="1">
+            <a:schemeClr val="accent1"/>
+          </a:fillRef>
+          <a:effectRef idx="0">
+            <a:schemeClr val="accent1"/>
+          </a:effectRef>
+          <a:fontRef idx="minor">
+            <a:schemeClr val="lt1"/>
+          </a:fontRef>
+        </p:style>
+        <p:txBody>
+          <a:bodyPr rtlCol="0" anchor="ctr"/>
+          <a:lstStyle/>
+          <a:p>
+            <a:pPr algn="ctr"/>
+            <a:r>
+              <a:rPr lang="en-US" sz="3600" spc="-60" dirty="0">
+                <a:solidFill>
+                  <a:srgbClr val="FFFFFF"/>
+                </a:solidFill>
+                <a:latin typeface="+mj-lt"/>
+                <a:ea typeface="+mj-ea"/>
+                <a:cs typeface="+mj-cs"/>
+              </a:rPr>
+              <a:t>Flights</a:t>
+            </a:r>
+          </a:p>
+        </p:txBody>
+      </p:sp>
+      <p:pic>
+        <p:nvPicPr>
+          <p:cNvPr id="4" name="Picture 3">
+            <a:extLst>
+              <a:ext uri="{FF2B5EF4-FFF2-40B4-BE49-F238E27FC236}">
+                <a16:creationId xmlns:a16="http://schemas.microsoft.com/office/drawing/2014/main" id="{0564CDA4-2171-E6CC-14F8-B28FE991CFAF}"/>
+              </a:ext>
+            </a:extLst>
+          </p:cNvPr>
+          <p:cNvPicPr>
+            <a:picLocks noChangeAspect="1"/>
+          </p:cNvPicPr>
+          <p:nvPr/>
+        </p:nvPicPr>
+        <p:blipFill>
+          <a:blip r:embed="rId2"/>
+          <a:stretch>
+            <a:fillRect/>
+          </a:stretch>
+        </p:blipFill>
+        <p:spPr>
+          <a:xfrm>
+            <a:off x="400460" y="1320330"/>
+            <a:ext cx="2585336" cy="4793310"/>
+          </a:xfrm>
+          <a:prstGeom prst="rect">
+            <a:avLst/>
+          </a:prstGeom>
+        </p:spPr>
+      </p:pic>
+      <p:pic>
+        <p:nvPicPr>
+          <p:cNvPr id="6" name="Picture 5">
+            <a:extLst>
+              <a:ext uri="{FF2B5EF4-FFF2-40B4-BE49-F238E27FC236}">
+                <a16:creationId xmlns:a16="http://schemas.microsoft.com/office/drawing/2014/main" id="{A1B62675-89F9-A84E-3F7F-3EB7A3DE2233}"/>
+              </a:ext>
+            </a:extLst>
+          </p:cNvPr>
+          <p:cNvPicPr>
+            <a:picLocks noChangeAspect="1"/>
+          </p:cNvPicPr>
+          <p:nvPr/>
+        </p:nvPicPr>
+        <p:blipFill>
+          <a:blip r:embed="rId3"/>
+          <a:stretch>
+            <a:fillRect/>
+          </a:stretch>
+        </p:blipFill>
+        <p:spPr>
+          <a:xfrm>
+            <a:off x="785381" y="4486426"/>
+            <a:ext cx="600159" cy="609685"/>
+          </a:xfrm>
+          <a:prstGeom prst="rect">
+            <a:avLst/>
+          </a:prstGeom>
+        </p:spPr>
+      </p:pic>
+      <p:pic>
+        <p:nvPicPr>
+          <p:cNvPr id="8" name="Picture 7">
+            <a:extLst>
+              <a:ext uri="{FF2B5EF4-FFF2-40B4-BE49-F238E27FC236}">
+                <a16:creationId xmlns:a16="http://schemas.microsoft.com/office/drawing/2014/main" id="{FA3A3B40-1FB9-FE91-AE57-B54EAC681D53}"/>
+              </a:ext>
+            </a:extLst>
+          </p:cNvPr>
+          <p:cNvPicPr>
+            <a:picLocks noChangeAspect="1"/>
+          </p:cNvPicPr>
+          <p:nvPr/>
+        </p:nvPicPr>
+        <p:blipFill rotWithShape="1">
+          <a:blip r:embed="rId3"/>
+          <a:srcRect b="12527"/>
+          <a:stretch/>
+        </p:blipFill>
+        <p:spPr>
+          <a:xfrm>
+            <a:off x="785380" y="5210266"/>
+            <a:ext cx="600159" cy="533309"/>
+          </a:xfrm>
+          <a:prstGeom prst="rect">
+            <a:avLst/>
+          </a:prstGeom>
+        </p:spPr>
+      </p:pic>
+      <p:pic>
+        <p:nvPicPr>
+          <p:cNvPr id="10" name="Picture 9">
+            <a:extLst>
+              <a:ext uri="{FF2B5EF4-FFF2-40B4-BE49-F238E27FC236}">
+                <a16:creationId xmlns:a16="http://schemas.microsoft.com/office/drawing/2014/main" id="{1038A4DD-9BE9-3781-F289-3BDBD8DA4F2E}"/>
+              </a:ext>
+            </a:extLst>
+          </p:cNvPr>
+          <p:cNvPicPr>
+            <a:picLocks noChangeAspect="1"/>
+          </p:cNvPicPr>
+          <p:nvPr/>
+        </p:nvPicPr>
+        <p:blipFill rotWithShape="1">
+          <a:blip r:embed="rId4"/>
+          <a:srcRect b="19947"/>
+          <a:stretch/>
+        </p:blipFill>
+        <p:spPr>
+          <a:xfrm>
+            <a:off x="1622982" y="5537670"/>
+            <a:ext cx="981212" cy="205905"/>
+          </a:xfrm>
+          <a:prstGeom prst="rect">
+            <a:avLst/>
+          </a:prstGeom>
+        </p:spPr>
+      </p:pic>
+      <p:pic>
+        <p:nvPicPr>
+          <p:cNvPr id="12" name="Picture 11">
+            <a:extLst>
+              <a:ext uri="{FF2B5EF4-FFF2-40B4-BE49-F238E27FC236}">
+                <a16:creationId xmlns:a16="http://schemas.microsoft.com/office/drawing/2014/main" id="{EB065E21-F4CB-BFB4-1B21-EBA0126FC713}"/>
+              </a:ext>
+            </a:extLst>
+          </p:cNvPr>
+          <p:cNvPicPr>
+            <a:picLocks noChangeAspect="1"/>
+          </p:cNvPicPr>
+          <p:nvPr/>
+        </p:nvPicPr>
+        <p:blipFill>
+          <a:blip r:embed="rId5"/>
+          <a:stretch>
+            <a:fillRect/>
+          </a:stretch>
+        </p:blipFill>
+        <p:spPr>
+          <a:xfrm>
+            <a:off x="1385539" y="5233593"/>
+            <a:ext cx="752580" cy="238158"/>
+          </a:xfrm>
+          <a:prstGeom prst="rect">
+            <a:avLst/>
+          </a:prstGeom>
+        </p:spPr>
+      </p:pic>
+      <p:sp>
+        <p:nvSpPr>
+          <p:cNvPr id="14" name="TextBox 13">
+            <a:extLst>
+              <a:ext uri="{FF2B5EF4-FFF2-40B4-BE49-F238E27FC236}">
+                <a16:creationId xmlns:a16="http://schemas.microsoft.com/office/drawing/2014/main" id="{8603D09F-6B27-991A-B12C-E50B26C91C40}"/>
+              </a:ext>
+            </a:extLst>
+          </p:cNvPr>
+          <p:cNvSpPr txBox="1"/>
+          <p:nvPr/>
+        </p:nvSpPr>
+        <p:spPr>
+          <a:xfrm>
+            <a:off x="4535680" y="2697744"/>
+            <a:ext cx="6097424" cy="880369"/>
+          </a:xfrm>
+          <a:prstGeom prst="rect">
+            <a:avLst/>
+          </a:prstGeom>
+          <a:noFill/>
+        </p:spPr>
+        <p:txBody>
+          <a:bodyPr wrap="square">
+            <a:spAutoFit/>
+          </a:bodyPr>
+          <a:lstStyle/>
+          <a:p>
+            <a:pPr>
+              <a:lnSpc>
+                <a:spcPct val="150000"/>
+              </a:lnSpc>
+              <a:buFont typeface="Wingdings" panose="05000000000000000000" pitchFamily="2" charset="2"/>
+              <a:buChar char="Ø"/>
+            </a:pPr>
+            <a:r>
+              <a:rPr lang="en-US" dirty="0"/>
+              <a:t> Browse through the flights that are in the hot for you page. You are also able to view the details as show in the mockup.</a:t>
+            </a:r>
+          </a:p>
+        </p:txBody>
+      </p:sp>
+    </p:spTree>
+    <p:extLst>
+      <p:ext uri="{BB962C8B-B14F-4D97-AF65-F5344CB8AC3E}">
+        <p14:creationId xmlns:p14="http://schemas.microsoft.com/office/powerpoint/2010/main" val="2794442424"/>
+      </p:ext>
+    </p:extLst>
+  </p:cSld>
+  <p:clrMapOvr>
+    <a:masterClrMapping/>
+  </p:clrMapOvr>
+</p:sld>
+</file>
+
+<file path=ppt/slides/slide9.xml><?xml version="1.0" encoding="utf-8"?>
 <p:sld xmlns:a="http://schemas.openxmlformats.org/drawingml/2006/main" xmlns:r="http://schemas.openxmlformats.org/officeDocument/2006/relationships" xmlns:p="http://schemas.openxmlformats.org/presentationml/2006/main">
   <p:cSld>
     <p:spTree>
@@ -6689,7 +7172,7 @@
           <p:cNvPr id="2" name="Rectangle 1">
             <a:extLst>
               <a:ext uri="{FF2B5EF4-FFF2-40B4-BE49-F238E27FC236}">
-                <a16:creationId xmlns="" xmlns:a16="http://schemas.microsoft.com/office/drawing/2014/main" id="{A626BE00-405A-4B10-AE3D-72CC571AE9B0}"/>
+                <a16:creationId xmlns:a16="http://schemas.microsoft.com/office/drawing/2014/main" id="{A626BE00-405A-4B10-AE3D-72CC571AE9B0}"/>
               </a:ext>
             </a:extLst>
           </p:cNvPr>
@@ -6732,7 +7215,7 @@
           <a:p>
             <a:pPr algn="ctr"/>
             <a:r>
-              <a:rPr lang="en-US" sz="3600" spc="-60" dirty="0" smtClean="0">
+              <a:rPr lang="en-US" sz="3600" spc="-60" dirty="0">
                 <a:solidFill>
                   <a:srgbClr val="FFFFFF"/>
                 </a:solidFill>
@@ -6742,14 +7225,6 @@
               </a:rPr>
               <a:t>Favorites</a:t>
             </a:r>
-            <a:endParaRPr lang="en-US" sz="3600" spc="-60" dirty="0">
-              <a:solidFill>
-                <a:srgbClr val="FFFFFF"/>
-              </a:solidFill>
-              <a:latin typeface="+mj-lt"/>
-              <a:ea typeface="+mj-ea"/>
-              <a:cs typeface="+mj-cs"/>
-            </a:endParaRPr>
           </a:p>
         </p:txBody>
       </p:sp>
@@ -7024,21 +7499,16 @@
             </a:pPr>
             <a:r>
               <a:rPr lang="en-US" dirty="0"/>
-              <a:t> </a:t>
-            </a:r>
-            <a:r>
-              <a:rPr lang="en-US" dirty="0" smtClean="0"/>
-              <a:t>View and Add your favorite flights with their corresponding price to your favorites list. Click on </a:t>
-            </a:r>
-            <a:r>
-              <a:rPr lang="en-US" i="1" dirty="0" smtClean="0"/>
+              <a:t> View and Add your favorite flights with their corresponding price to your favorites list. Click on </a:t>
+            </a:r>
+            <a:r>
+              <a:rPr lang="en-US" i="1" dirty="0"/>
               <a:t>more details </a:t>
             </a:r>
             <a:r>
-              <a:rPr lang="en-US" dirty="0" smtClean="0"/>
+              <a:rPr lang="en-US" dirty="0"/>
               <a:t>to find out more information on that flight.</a:t>
             </a:r>
-            <a:endParaRPr lang="en-US" dirty="0"/>
           </a:p>
         </p:txBody>
       </p:sp>
@@ -7106,118 +7576,6 @@
   <p:clrMapOvr>
     <a:masterClrMapping/>
   </p:clrMapOvr>
-  <p:timing>
-    <p:tnLst>
-      <p:par>
-        <p:cTn id="1" dur="indefinite" restart="never" nodeType="tmRoot"/>
-      </p:par>
-    </p:tnLst>
-  </p:timing>
-</p:sld>
-</file>
-
-<file path=ppt/slides/slide9.xml><?xml version="1.0" encoding="utf-8"?>
-<p:sld xmlns:a="http://schemas.openxmlformats.org/drawingml/2006/main" xmlns:r="http://schemas.openxmlformats.org/officeDocument/2006/relationships" xmlns:p="http://schemas.openxmlformats.org/presentationml/2006/main">
-  <p:cSld>
-    <p:spTree>
-      <p:nvGrpSpPr>
-        <p:cNvPr id="1" name=""/>
-        <p:cNvGrpSpPr/>
-        <p:nvPr/>
-      </p:nvGrpSpPr>
-      <p:grpSpPr>
-        <a:xfrm>
-          <a:off x="0" y="0"/>
-          <a:ext cx="0" cy="0"/>
-          <a:chOff x="0" y="0"/>
-          <a:chExt cx="0" cy="0"/>
-        </a:xfrm>
-      </p:grpSpPr>
-      <p:sp>
-        <p:nvSpPr>
-          <p:cNvPr id="2" name="Title 1"/>
-          <p:cNvSpPr>
-            <a:spLocks noGrp="1"/>
-          </p:cNvSpPr>
-          <p:nvPr>
-            <p:ph type="title"/>
-          </p:nvPr>
-        </p:nvSpPr>
-        <p:spPr/>
-        <p:txBody>
-          <a:bodyPr/>
-          <a:lstStyle/>
-          <a:p>
-            <a:r>
-              <a:rPr lang="en-US" dirty="0" smtClean="0"/>
-              <a:t>Additional Information</a:t>
-            </a:r>
-            <a:endParaRPr lang="en-US" dirty="0"/>
-          </a:p>
-        </p:txBody>
-      </p:sp>
-      <p:sp>
-        <p:nvSpPr>
-          <p:cNvPr id="3" name="Content Placeholder 2"/>
-          <p:cNvSpPr>
-            <a:spLocks noGrp="1"/>
-          </p:cNvSpPr>
-          <p:nvPr>
-            <p:ph idx="1"/>
-          </p:nvPr>
-        </p:nvSpPr>
-        <p:spPr/>
-        <p:txBody>
-          <a:bodyPr/>
-          <a:lstStyle/>
-          <a:p>
-            <a:r>
-              <a:rPr lang="en-US" dirty="0" smtClean="0"/>
-              <a:t>Number of Screen Flows: 8</a:t>
-            </a:r>
-          </a:p>
-          <a:p>
-            <a:r>
-              <a:rPr lang="en-US" dirty="0" smtClean="0"/>
-              <a:t>Chosen Database: Firebase</a:t>
-            </a:r>
-          </a:p>
-          <a:p>
-            <a:r>
-              <a:rPr lang="en-US" dirty="0" err="1" smtClean="0"/>
-              <a:t>GitHub</a:t>
-            </a:r>
-            <a:r>
-              <a:rPr lang="en-US" dirty="0" smtClean="0"/>
-              <a:t> Link: </a:t>
-            </a:r>
-            <a:r>
-              <a:rPr lang="en-US" dirty="0" smtClean="0">
-                <a:hlinkClick r:id="rId2"/>
-              </a:rPr>
-              <a:t>Project Aero Flights</a:t>
-            </a:r>
-            <a:endParaRPr lang="en-US" dirty="0"/>
-          </a:p>
-        </p:txBody>
-      </p:sp>
-    </p:spTree>
-    <p:extLst>
-      <p:ext uri="{BB962C8B-B14F-4D97-AF65-F5344CB8AC3E}">
-        <p14:creationId xmlns:p14="http://schemas.microsoft.com/office/powerpoint/2010/main" val="3539673659"/>
-      </p:ext>
-    </p:extLst>
-  </p:cSld>
-  <p:clrMapOvr>
-    <a:masterClrMapping/>
-  </p:clrMapOvr>
-  <p:timing>
-    <p:tnLst>
-      <p:par>
-        <p:cTn id="1" dur="indefinite" restart="never" nodeType="tmRoot"/>
-      </p:par>
-    </p:tnLst>
-  </p:timing>
 </p:sld>
 </file>
 

</xml_diff>

<commit_message>
Added google and facebook sign in
</commit_message>
<xml_diff>
--- a/Aero_Flights_Deliverable_0.pptx
+++ b/Aero_Flights_Deliverable_0.pptx
@@ -5205,6 +5205,66 @@
           </a:prstGeom>
         </p:spPr>
       </p:pic>
+      <p:pic>
+        <p:nvPicPr>
+          <p:cNvPr id="17" name="Picture 16">
+            <a:extLst>
+              <a:ext uri="{FF2B5EF4-FFF2-40B4-BE49-F238E27FC236}">
+                <a16:creationId xmlns:a16="http://schemas.microsoft.com/office/drawing/2014/main" id="{E96F4988-CC9E-45F3-BEF9-F3092721032C}"/>
+              </a:ext>
+            </a:extLst>
+          </p:cNvPr>
+          <p:cNvPicPr>
+            <a:picLocks noChangeAspect="1"/>
+          </p:cNvPicPr>
+          <p:nvPr/>
+        </p:nvPicPr>
+        <p:blipFill>
+          <a:blip r:embed="rId12"/>
+          <a:stretch>
+            <a:fillRect/>
+          </a:stretch>
+        </p:blipFill>
+        <p:spPr>
+          <a:xfrm>
+            <a:off x="2314635" y="4112666"/>
+            <a:ext cx="896612" cy="173209"/>
+          </a:xfrm>
+          <a:prstGeom prst="rect">
+            <a:avLst/>
+          </a:prstGeom>
+        </p:spPr>
+      </p:pic>
+      <p:pic>
+        <p:nvPicPr>
+          <p:cNvPr id="20" name="Picture 19">
+            <a:extLst>
+              <a:ext uri="{FF2B5EF4-FFF2-40B4-BE49-F238E27FC236}">
+                <a16:creationId xmlns:a16="http://schemas.microsoft.com/office/drawing/2014/main" id="{260A1802-B775-4078-8DE0-FC9D60F5CA11}"/>
+              </a:ext>
+            </a:extLst>
+          </p:cNvPr>
+          <p:cNvPicPr>
+            <a:picLocks noChangeAspect="1"/>
+          </p:cNvPicPr>
+          <p:nvPr/>
+        </p:nvPicPr>
+        <p:blipFill>
+          <a:blip r:embed="rId13"/>
+          <a:stretch>
+            <a:fillRect/>
+          </a:stretch>
+        </p:blipFill>
+        <p:spPr>
+          <a:xfrm>
+            <a:off x="2307385" y="4319140"/>
+            <a:ext cx="899624" cy="168202"/>
+          </a:xfrm>
+          <a:prstGeom prst="rect">
+            <a:avLst/>
+          </a:prstGeom>
+        </p:spPr>
+      </p:pic>
     </p:spTree>
     <p:extLst>
       <p:ext uri="{BB962C8B-B14F-4D97-AF65-F5344CB8AC3E}">
@@ -6196,6 +6256,66 @@
               </a14:hiddenFill>
             </a:ext>
           </a:extLst>
+        </p:spPr>
+      </p:pic>
+      <p:pic>
+        <p:nvPicPr>
+          <p:cNvPr id="9" name="Picture 8">
+            <a:extLst>
+              <a:ext uri="{FF2B5EF4-FFF2-40B4-BE49-F238E27FC236}">
+                <a16:creationId xmlns:a16="http://schemas.microsoft.com/office/drawing/2014/main" id="{5351B10D-5B96-4542-8C10-AD13511DC630}"/>
+              </a:ext>
+            </a:extLst>
+          </p:cNvPr>
+          <p:cNvPicPr>
+            <a:picLocks noChangeAspect="1"/>
+          </p:cNvPicPr>
+          <p:nvPr/>
+        </p:nvPicPr>
+        <p:blipFill>
+          <a:blip r:embed="rId3"/>
+          <a:stretch>
+            <a:fillRect/>
+          </a:stretch>
+        </p:blipFill>
+        <p:spPr>
+          <a:xfrm>
+            <a:off x="1224238" y="5652996"/>
+            <a:ext cx="1645348" cy="307629"/>
+          </a:xfrm>
+          <a:prstGeom prst="rect">
+            <a:avLst/>
+          </a:prstGeom>
+        </p:spPr>
+      </p:pic>
+      <p:pic>
+        <p:nvPicPr>
+          <p:cNvPr id="10" name="Picture 9">
+            <a:extLst>
+              <a:ext uri="{FF2B5EF4-FFF2-40B4-BE49-F238E27FC236}">
+                <a16:creationId xmlns:a16="http://schemas.microsoft.com/office/drawing/2014/main" id="{1F8AAB25-703A-4187-BFF1-5386A8DE4449}"/>
+              </a:ext>
+            </a:extLst>
+          </p:cNvPr>
+          <p:cNvPicPr>
+            <a:picLocks noChangeAspect="1"/>
+          </p:cNvPicPr>
+          <p:nvPr/>
+        </p:nvPicPr>
+        <p:blipFill>
+          <a:blip r:embed="rId4"/>
+          <a:stretch>
+            <a:fillRect/>
+          </a:stretch>
+        </p:blipFill>
+        <p:spPr>
+          <a:xfrm>
+            <a:off x="1224238" y="5286888"/>
+            <a:ext cx="1645348" cy="317851"/>
+          </a:xfrm>
+          <a:prstGeom prst="rect">
+            <a:avLst/>
+          </a:prstGeom>
         </p:spPr>
       </p:pic>
     </p:spTree>

</xml_diff>